<commit_message>
add smart ptr hw
</commit_message>
<xml_diff>
--- a/src/07-DailyNeeds/07-DailyNeeds.pptx
+++ b/src/07-DailyNeeds/07-DailyNeeds.pptx
@@ -14,8 +14,9 @@
     <p:sldId id="271" r:id="rId8"/>
     <p:sldId id="273" r:id="rId9"/>
     <p:sldId id="272" r:id="rId10"/>
-    <p:sldId id="268" r:id="rId11"/>
-    <p:sldId id="258" r:id="rId12"/>
+    <p:sldId id="274" r:id="rId11"/>
+    <p:sldId id="268" r:id="rId12"/>
+    <p:sldId id="258" r:id="rId13"/>
   </p:sldIdLst>
   <p:sldSz cx="12192000" cy="6858000"/>
   <p:notesSz cx="6858000" cy="9144000"/>
@@ -132,6 +133,7 @@
             <p14:sldId id="271"/>
             <p14:sldId id="273"/>
             <p14:sldId id="272"/>
+            <p14:sldId id="274"/>
             <p14:sldId id="268"/>
           </p14:sldIdLst>
         </p14:section>
@@ -329,7 +331,7 @@
           <a:p>
             <a:fld id="{EFAAC8F1-21AA-47EF-82D9-7929EA07D29D}" type="datetimeFigureOut">
               <a:rPr lang="ru-RU" smtClean="0"/>
-              <a:t>04.03.2023</a:t>
+              <a:t>06.03.2023</a:t>
             </a:fld>
             <a:endParaRPr lang="ru-RU"/>
           </a:p>
@@ -529,7 +531,7 @@
           <a:p>
             <a:fld id="{EFAAC8F1-21AA-47EF-82D9-7929EA07D29D}" type="datetimeFigureOut">
               <a:rPr lang="ru-RU" smtClean="0"/>
-              <a:t>04.03.2023</a:t>
+              <a:t>06.03.2023</a:t>
             </a:fld>
             <a:endParaRPr lang="ru-RU"/>
           </a:p>
@@ -739,7 +741,7 @@
           <a:p>
             <a:fld id="{EFAAC8F1-21AA-47EF-82D9-7929EA07D29D}" type="datetimeFigureOut">
               <a:rPr lang="ru-RU" smtClean="0"/>
-              <a:t>04.03.2023</a:t>
+              <a:t>06.03.2023</a:t>
             </a:fld>
             <a:endParaRPr lang="ru-RU"/>
           </a:p>
@@ -939,7 +941,7 @@
           <a:p>
             <a:fld id="{EFAAC8F1-21AA-47EF-82D9-7929EA07D29D}" type="datetimeFigureOut">
               <a:rPr lang="ru-RU" smtClean="0"/>
-              <a:t>04.03.2023</a:t>
+              <a:t>06.03.2023</a:t>
             </a:fld>
             <a:endParaRPr lang="ru-RU"/>
           </a:p>
@@ -1215,7 +1217,7 @@
           <a:p>
             <a:fld id="{EFAAC8F1-21AA-47EF-82D9-7929EA07D29D}" type="datetimeFigureOut">
               <a:rPr lang="ru-RU" smtClean="0"/>
-              <a:t>04.03.2023</a:t>
+              <a:t>06.03.2023</a:t>
             </a:fld>
             <a:endParaRPr lang="ru-RU"/>
           </a:p>
@@ -1483,7 +1485,7 @@
           <a:p>
             <a:fld id="{EFAAC8F1-21AA-47EF-82D9-7929EA07D29D}" type="datetimeFigureOut">
               <a:rPr lang="ru-RU" smtClean="0"/>
-              <a:t>04.03.2023</a:t>
+              <a:t>06.03.2023</a:t>
             </a:fld>
             <a:endParaRPr lang="ru-RU"/>
           </a:p>
@@ -1898,7 +1900,7 @@
           <a:p>
             <a:fld id="{EFAAC8F1-21AA-47EF-82D9-7929EA07D29D}" type="datetimeFigureOut">
               <a:rPr lang="ru-RU" smtClean="0"/>
-              <a:t>04.03.2023</a:t>
+              <a:t>06.03.2023</a:t>
             </a:fld>
             <a:endParaRPr lang="ru-RU"/>
           </a:p>
@@ -2040,7 +2042,7 @@
           <a:p>
             <a:fld id="{EFAAC8F1-21AA-47EF-82D9-7929EA07D29D}" type="datetimeFigureOut">
               <a:rPr lang="ru-RU" smtClean="0"/>
-              <a:t>04.03.2023</a:t>
+              <a:t>06.03.2023</a:t>
             </a:fld>
             <a:endParaRPr lang="ru-RU"/>
           </a:p>
@@ -2153,7 +2155,7 @@
           <a:p>
             <a:fld id="{EFAAC8F1-21AA-47EF-82D9-7929EA07D29D}" type="datetimeFigureOut">
               <a:rPr lang="ru-RU" smtClean="0"/>
-              <a:t>04.03.2023</a:t>
+              <a:t>06.03.2023</a:t>
             </a:fld>
             <a:endParaRPr lang="ru-RU"/>
           </a:p>
@@ -2466,7 +2468,7 @@
           <a:p>
             <a:fld id="{EFAAC8F1-21AA-47EF-82D9-7929EA07D29D}" type="datetimeFigureOut">
               <a:rPr lang="ru-RU" smtClean="0"/>
-              <a:t>04.03.2023</a:t>
+              <a:t>06.03.2023</a:t>
             </a:fld>
             <a:endParaRPr lang="ru-RU"/>
           </a:p>
@@ -2755,7 +2757,7 @@
           <a:p>
             <a:fld id="{EFAAC8F1-21AA-47EF-82D9-7929EA07D29D}" type="datetimeFigureOut">
               <a:rPr lang="ru-RU" smtClean="0"/>
-              <a:t>04.03.2023</a:t>
+              <a:t>06.03.2023</a:t>
             </a:fld>
             <a:endParaRPr lang="ru-RU"/>
           </a:p>
@@ -2998,7 +3000,7 @@
           <a:p>
             <a:fld id="{EFAAC8F1-21AA-47EF-82D9-7929EA07D29D}" type="datetimeFigureOut">
               <a:rPr lang="ru-RU" smtClean="0"/>
-              <a:t>04.03.2023</a:t>
+              <a:t>06.03.2023</a:t>
             </a:fld>
             <a:endParaRPr lang="ru-RU"/>
           </a:p>
@@ -3514,6 +3516,96 @@
           <p:cNvPr id="2" name="Title 1">
             <a:extLst>
               <a:ext uri="{FF2B5EF4-FFF2-40B4-BE49-F238E27FC236}">
+                <a16:creationId xmlns:a16="http://schemas.microsoft.com/office/drawing/2014/main" id="{5277FFE8-6491-39FD-A2F8-B76961470EE3}"/>
+              </a:ext>
+            </a:extLst>
+          </p:cNvPr>
+          <p:cNvSpPr>
+            <a:spLocks noGrp="1"/>
+          </p:cNvSpPr>
+          <p:nvPr>
+            <p:ph type="title"/>
+          </p:nvPr>
+        </p:nvSpPr>
+        <p:spPr/>
+        <p:txBody>
+          <a:bodyPr/>
+          <a:lstStyle/>
+          <a:p>
+            <a:r>
+              <a:rPr lang="en-US" dirty="0"/>
+              <a:t>Sorting</a:t>
+            </a:r>
+            <a:endParaRPr lang="ru-RU" dirty="0"/>
+          </a:p>
+        </p:txBody>
+      </p:sp>
+      <p:sp>
+        <p:nvSpPr>
+          <p:cNvPr id="3" name="Content Placeholder 2">
+            <a:extLst>
+              <a:ext uri="{FF2B5EF4-FFF2-40B4-BE49-F238E27FC236}">
+                <a16:creationId xmlns:a16="http://schemas.microsoft.com/office/drawing/2014/main" id="{EFE63E19-09BF-44C9-3972-C4D3DDFAEF85}"/>
+              </a:ext>
+            </a:extLst>
+          </p:cNvPr>
+          <p:cNvSpPr>
+            <a:spLocks noGrp="1"/>
+          </p:cNvSpPr>
+          <p:nvPr>
+            <p:ph idx="1"/>
+          </p:nvPr>
+        </p:nvSpPr>
+        <p:spPr/>
+        <p:txBody>
+          <a:bodyPr/>
+          <a:lstStyle/>
+          <a:p>
+            <a:r>
+              <a:rPr lang="en-US" dirty="0"/>
+              <a:t>TODO: compare with C#/Java/etc.</a:t>
+            </a:r>
+          </a:p>
+          <a:p>
+            <a:endParaRPr lang="ru-RU" dirty="0"/>
+          </a:p>
+        </p:txBody>
+      </p:sp>
+    </p:spTree>
+    <p:extLst>
+      <p:ext uri="{BB962C8B-B14F-4D97-AF65-F5344CB8AC3E}">
+        <p14:creationId xmlns:p14="http://schemas.microsoft.com/office/powerpoint/2010/main" val="2938217508"/>
+      </p:ext>
+    </p:extLst>
+  </p:cSld>
+  <p:clrMapOvr>
+    <a:masterClrMapping/>
+  </p:clrMapOvr>
+</p:sld>
+</file>
+
+<file path=ppt/slides/slide11.xml><?xml version="1.0" encoding="utf-8"?>
+<p:sld xmlns:a="http://schemas.openxmlformats.org/drawingml/2006/main" xmlns:r="http://schemas.openxmlformats.org/officeDocument/2006/relationships" xmlns:p="http://schemas.openxmlformats.org/presentationml/2006/main">
+  <p:cSld>
+    <p:spTree>
+      <p:nvGrpSpPr>
+        <p:cNvPr id="1" name=""/>
+        <p:cNvGrpSpPr/>
+        <p:nvPr/>
+      </p:nvGrpSpPr>
+      <p:grpSpPr>
+        <a:xfrm>
+          <a:off x="0" y="0"/>
+          <a:ext cx="0" cy="0"/>
+          <a:chOff x="0" y="0"/>
+          <a:chExt cx="0" cy="0"/>
+        </a:xfrm>
+      </p:grpSpPr>
+      <p:sp>
+        <p:nvSpPr>
+          <p:cNvPr id="2" name="Title 1">
+            <a:extLst>
+              <a:ext uri="{FF2B5EF4-FFF2-40B4-BE49-F238E27FC236}">
                 <a16:creationId xmlns:a16="http://schemas.microsoft.com/office/drawing/2014/main" id="{6BA6DD97-A6C5-76F0-123D-43A69232EF62}"/>
               </a:ext>
             </a:extLst>
@@ -4061,7 +4153,7 @@
 </p:sld>
 </file>
 
-<file path=ppt/slides/slide11.xml><?xml version="1.0" encoding="utf-8"?>
+<file path=ppt/slides/slide12.xml><?xml version="1.0" encoding="utf-8"?>
 <p:sld xmlns:a="http://schemas.openxmlformats.org/drawingml/2006/main" xmlns:r="http://schemas.openxmlformats.org/officeDocument/2006/relationships" xmlns:p="http://schemas.openxmlformats.org/presentationml/2006/main">
   <p:cSld>
     <p:spTree>
@@ -10204,20 +10296,6 @@
               <a:t>: one to many</a:t>
             </a:r>
           </a:p>
-          <a:p>
-            <a:r>
-              <a:rPr lang="en-US" dirty="0" err="1"/>
-              <a:t>sorted_by</a:t>
-            </a:r>
-            <a:r>
-              <a:rPr lang="en-US"/>
-              <a:t>: </a:t>
-            </a:r>
-            <a:endParaRPr lang="en-US" dirty="0"/>
-          </a:p>
-          <a:p>
-            <a:endParaRPr lang="ru-RU" dirty="0"/>
-          </a:p>
         </p:txBody>
       </p:sp>
     </p:spTree>
@@ -10540,55 +10618,6 @@
                       </p:childTnLst>
                     </p:cTn>
                   </p:par>
-                  <p:par>
-                    <p:cTn id="25" fill="hold">
-                      <p:stCondLst>
-                        <p:cond delay="indefinite"/>
-                      </p:stCondLst>
-                      <p:childTnLst>
-                        <p:par>
-                          <p:cTn id="26" fill="hold">
-                            <p:stCondLst>
-                              <p:cond delay="0"/>
-                            </p:stCondLst>
-                            <p:childTnLst>
-                              <p:par>
-                                <p:cTn id="27" presetID="1" presetClass="entr" presetSubtype="0" fill="hold" grpId="0" nodeType="clickEffect">
-                                  <p:stCondLst>
-                                    <p:cond delay="0"/>
-                                  </p:stCondLst>
-                                  <p:childTnLst>
-                                    <p:set>
-                                      <p:cBhvr>
-                                        <p:cTn id="28" dur="1" fill="hold">
-                                          <p:stCondLst>
-                                            <p:cond delay="0"/>
-                                          </p:stCondLst>
-                                        </p:cTn>
-                                        <p:tgtEl>
-                                          <p:spTgt spid="5">
-                                            <p:txEl>
-                                              <p:pRg st="8" end="8"/>
-                                            </p:txEl>
-                                          </p:spTgt>
-                                        </p:tgtEl>
-                                        <p:attrNameLst>
-                                          <p:attrName>style.visibility</p:attrName>
-                                        </p:attrNameLst>
-                                      </p:cBhvr>
-                                      <p:to>
-                                        <p:strVal val="visible"/>
-                                      </p:to>
-                                    </p:set>
-                                  </p:childTnLst>
-                                </p:cTn>
-                              </p:par>
-                            </p:childTnLst>
-                          </p:cTn>
-                        </p:par>
-                      </p:childTnLst>
-                    </p:cTn>
-                  </p:par>
                 </p:childTnLst>
               </p:cTn>
               <p:prevCondLst>
@@ -10704,7 +10733,7 @@
           <a:p>
             <a:r>
               <a:rPr lang="en-US" dirty="0"/>
-              <a:t>Sequences: map, filter, sorted, etc.</a:t>
+              <a:t>Sequences: map, filter, etc.</a:t>
             </a:r>
           </a:p>
           <a:p>

</xml_diff>